<commit_message>
imperative form starting code
</commit_message>
<xml_diff>
--- a/ClassMaterials/CPSDatatypesInterpreter/31-CPS-interpreter-and-callCC.pptx
+++ b/ClassMaterials/CPSDatatypesInterpreter/31-CPS-interpreter-and-callCC.pptx
@@ -5,10 +5,10 @@
     <p:sldMasterId id="2147483648" r:id="rId1"/>
   </p:sldMasterIdLst>
   <p:notesMasterIdLst>
-    <p:notesMasterId r:id="rId40"/>
+    <p:notesMasterId r:id="rId41"/>
   </p:notesMasterIdLst>
   <p:handoutMasterIdLst>
-    <p:handoutMasterId r:id="rId41"/>
+    <p:handoutMasterId r:id="rId42"/>
   </p:handoutMasterIdLst>
   <p:sldIdLst>
     <p:sldId id="345" r:id="rId2"/>
@@ -26,29 +26,30 @@
     <p:sldId id="339" r:id="rId14"/>
     <p:sldId id="356" r:id="rId15"/>
     <p:sldId id="430" r:id="rId16"/>
-    <p:sldId id="428" r:id="rId17"/>
-    <p:sldId id="429" r:id="rId18"/>
-    <p:sldId id="368" r:id="rId19"/>
-    <p:sldId id="369" r:id="rId20"/>
-    <p:sldId id="370" r:id="rId21"/>
-    <p:sldId id="371" r:id="rId22"/>
-    <p:sldId id="372" r:id="rId23"/>
-    <p:sldId id="373" r:id="rId24"/>
-    <p:sldId id="374" r:id="rId25"/>
-    <p:sldId id="418" r:id="rId26"/>
-    <p:sldId id="360" r:id="rId27"/>
-    <p:sldId id="406" r:id="rId28"/>
-    <p:sldId id="407" r:id="rId29"/>
-    <p:sldId id="408" r:id="rId30"/>
-    <p:sldId id="409" r:id="rId31"/>
-    <p:sldId id="410" r:id="rId32"/>
-    <p:sldId id="411" r:id="rId33"/>
-    <p:sldId id="412" r:id="rId34"/>
-    <p:sldId id="413" r:id="rId35"/>
-    <p:sldId id="414" r:id="rId36"/>
-    <p:sldId id="415" r:id="rId37"/>
-    <p:sldId id="416" r:id="rId38"/>
-    <p:sldId id="417" r:id="rId39"/>
+    <p:sldId id="434" r:id="rId17"/>
+    <p:sldId id="428" r:id="rId18"/>
+    <p:sldId id="429" r:id="rId19"/>
+    <p:sldId id="368" r:id="rId20"/>
+    <p:sldId id="369" r:id="rId21"/>
+    <p:sldId id="370" r:id="rId22"/>
+    <p:sldId id="371" r:id="rId23"/>
+    <p:sldId id="372" r:id="rId24"/>
+    <p:sldId id="373" r:id="rId25"/>
+    <p:sldId id="374" r:id="rId26"/>
+    <p:sldId id="418" r:id="rId27"/>
+    <p:sldId id="360" r:id="rId28"/>
+    <p:sldId id="406" r:id="rId29"/>
+    <p:sldId id="407" r:id="rId30"/>
+    <p:sldId id="408" r:id="rId31"/>
+    <p:sldId id="409" r:id="rId32"/>
+    <p:sldId id="410" r:id="rId33"/>
+    <p:sldId id="411" r:id="rId34"/>
+    <p:sldId id="412" r:id="rId35"/>
+    <p:sldId id="413" r:id="rId36"/>
+    <p:sldId id="414" r:id="rId37"/>
+    <p:sldId id="415" r:id="rId38"/>
+    <p:sldId id="416" r:id="rId39"/>
+    <p:sldId id="417" r:id="rId40"/>
   </p:sldIdLst>
   <p:sldSz cx="12192000" cy="6858000"/>
   <p:notesSz cx="7315200" cy="9601200"/>
@@ -194,6 +195,43 @@
     </p:ext>
   </p:extLst>
 </p:presentation>
+</file>
+
+<file path=ppt/changesInfos/changesInfo1.xml><?xml version="1.0" encoding="utf-8"?>
+<pc:chgInfo xmlns:a="http://schemas.openxmlformats.org/drawingml/2006/main" xmlns:r="http://schemas.openxmlformats.org/officeDocument/2006/relationships" xmlns:ac="http://schemas.microsoft.com/office/drawing/2013/main/command" xmlns:pc="http://schemas.microsoft.com/office/powerpoint/2013/main/command">
+  <pc:docChgLst>
+    <pc:chgData name="Hewner, Mike" userId="7f3f83dd-6dfb-4127-a87f-c1714bd4fac9" providerId="ADAL" clId="{6946D025-0B62-40FE-AF3B-00D082197967}"/>
+    <pc:docChg chg="custSel addSld modSld">
+      <pc:chgData name="Hewner, Mike" userId="7f3f83dd-6dfb-4127-a87f-c1714bd4fac9" providerId="ADAL" clId="{6946D025-0B62-40FE-AF3B-00D082197967}" dt="2021-10-29T14:58:32.031" v="233" actId="20577"/>
+      <pc:docMkLst>
+        <pc:docMk/>
+      </pc:docMkLst>
+      <pc:sldChg chg="modSp new mod">
+        <pc:chgData name="Hewner, Mike" userId="7f3f83dd-6dfb-4127-a87f-c1714bd4fac9" providerId="ADAL" clId="{6946D025-0B62-40FE-AF3B-00D082197967}" dt="2021-10-29T14:58:32.031" v="233" actId="20577"/>
+        <pc:sldMkLst>
+          <pc:docMk/>
+          <pc:sldMk cId="718008235" sldId="434"/>
+        </pc:sldMkLst>
+        <pc:spChg chg="mod">
+          <ac:chgData name="Hewner, Mike" userId="7f3f83dd-6dfb-4127-a87f-c1714bd4fac9" providerId="ADAL" clId="{6946D025-0B62-40FE-AF3B-00D082197967}" dt="2021-10-29T14:54:49.263" v="22" actId="20577"/>
+          <ac:spMkLst>
+            <pc:docMk/>
+            <pc:sldMk cId="718008235" sldId="434"/>
+            <ac:spMk id="2" creationId="{F66D7CE3-46CA-4959-8821-FA494859218C}"/>
+          </ac:spMkLst>
+        </pc:spChg>
+        <pc:spChg chg="mod">
+          <ac:chgData name="Hewner, Mike" userId="7f3f83dd-6dfb-4127-a87f-c1714bd4fac9" providerId="ADAL" clId="{6946D025-0B62-40FE-AF3B-00D082197967}" dt="2021-10-29T14:58:32.031" v="233" actId="20577"/>
+          <ac:spMkLst>
+            <pc:docMk/>
+            <pc:sldMk cId="718008235" sldId="434"/>
+            <ac:spMk id="3" creationId="{11F3564B-7837-4F7A-B337-91EC70C28BF0}"/>
+          </ac:spMkLst>
+        </pc:spChg>
+      </pc:sldChg>
+    </pc:docChg>
+  </pc:docChgLst>
+</pc:chgInfo>
 </file>
 
 <file path=ppt/handoutMasters/handoutMaster1.xml><?xml version="1.0" encoding="utf-8"?>
@@ -1280,7 +1318,7 @@
             <a:fld id="{51B6C25D-32DF-4D0B-A234-5B2E76B992BC}" type="slidenum">
               <a:rPr lang="en-US" smtClean="0"/>
               <a:pPr/>
-              <a:t>16</a:t>
+              <a:t>17</a:t>
             </a:fld>
             <a:endParaRPr lang="en-US"/>
           </a:p>
@@ -1370,7 +1408,7 @@
             <a:fld id="{51B6C25D-32DF-4D0B-A234-5B2E76B992BC}" type="slidenum">
               <a:rPr lang="en-US" smtClean="0"/>
               <a:pPr/>
-              <a:t>17</a:t>
+              <a:t>18</a:t>
             </a:fld>
             <a:endParaRPr lang="en-US"/>
           </a:p>
@@ -1460,7 +1498,7 @@
             <a:fld id="{51B6C25D-32DF-4D0B-A234-5B2E76B992BC}" type="slidenum">
               <a:rPr lang="en-US" smtClean="0"/>
               <a:pPr/>
-              <a:t>18</a:t>
+              <a:t>19</a:t>
             </a:fld>
             <a:endParaRPr lang="en-US"/>
           </a:p>
@@ -1516,7 +1554,7 @@
             <a:fld id="{CAD0BD42-3137-4785-9394-0E08EC5E33DD}" type="slidenum">
               <a:rPr lang="en-US"/>
               <a:pPr/>
-              <a:t>19</a:t>
+              <a:t>20</a:t>
             </a:fld>
             <a:endParaRPr lang="en-US"/>
           </a:p>
@@ -1644,7 +1682,7 @@
             <a:fld id="{C7DF5288-F286-4209-BED9-6E465F41A49E}" type="slidenum">
               <a:rPr lang="en-US"/>
               <a:pPr/>
-              <a:t>20</a:t>
+              <a:t>21</a:t>
             </a:fld>
             <a:endParaRPr lang="en-US"/>
           </a:p>
@@ -1772,7 +1810,7 @@
             <a:fld id="{A383E541-5AEA-4F3E-B5D7-2741315E0F8E}" type="slidenum">
               <a:rPr lang="en-US"/>
               <a:pPr/>
-              <a:t>21</a:t>
+              <a:t>22</a:t>
             </a:fld>
             <a:endParaRPr lang="en-US"/>
           </a:p>
@@ -1900,7 +1938,7 @@
             <a:fld id="{E8BF0CB9-A82F-4A98-BDF5-8D5534FFBA14}" type="slidenum">
               <a:rPr lang="en-US"/>
               <a:pPr/>
-              <a:t>22</a:t>
+              <a:t>23</a:t>
             </a:fld>
             <a:endParaRPr lang="en-US"/>
           </a:p>
@@ -2147,7 +2185,7 @@
             <a:fld id="{51B6C25D-32DF-4D0B-A234-5B2E76B992BC}" type="slidenum">
               <a:rPr lang="en-US" smtClean="0"/>
               <a:pPr/>
-              <a:t>23</a:t>
+              <a:t>24</a:t>
             </a:fld>
             <a:endParaRPr lang="en-US"/>
           </a:p>
@@ -2237,7 +2275,7 @@
             <a:fld id="{51B6C25D-32DF-4D0B-A234-5B2E76B992BC}" type="slidenum">
               <a:rPr lang="en-US" smtClean="0"/>
               <a:pPr/>
-              <a:t>24</a:t>
+              <a:t>25</a:t>
             </a:fld>
             <a:endParaRPr lang="en-US"/>
           </a:p>
@@ -2322,7 +2360,7 @@
             <a:fld id="{51B6C25D-32DF-4D0B-A234-5B2E76B992BC}" type="slidenum">
               <a:rPr lang="en-US" smtClean="0"/>
               <a:pPr/>
-              <a:t>25</a:t>
+              <a:t>26</a:t>
             </a:fld>
             <a:endParaRPr lang="en-US"/>
           </a:p>
@@ -2412,7 +2450,7 @@
             <a:fld id="{537B74A1-C2D6-4C45-BED2-ADE1E76F30BC}" type="slidenum">
               <a:rPr lang="en-US" smtClean="0"/>
               <a:pPr/>
-              <a:t>26</a:t>
+              <a:t>27</a:t>
             </a:fld>
             <a:endParaRPr lang="en-US"/>
           </a:p>
@@ -2506,7 +2544,7 @@
                 </a:solidFill>
               </a:rPr>
               <a:pPr/>
-              <a:t>36</a:t>
+              <a:t>37</a:t>
             </a:fld>
             <a:endParaRPr lang="en-US">
               <a:solidFill>
@@ -9394,6 +9432,135 @@
 </file>
 
 <file path=ppt/slides/slide16.xml><?xml version="1.0" encoding="utf-8"?>
+<p:sld xmlns:a="http://schemas.openxmlformats.org/drawingml/2006/main" xmlns:r="http://schemas.openxmlformats.org/officeDocument/2006/relationships" xmlns:p="http://schemas.openxmlformats.org/presentationml/2006/main">
+  <p:cSld>
+    <p:spTree>
+      <p:nvGrpSpPr>
+        <p:cNvPr id="1" name=""/>
+        <p:cNvGrpSpPr/>
+        <p:nvPr/>
+      </p:nvGrpSpPr>
+      <p:grpSpPr>
+        <a:xfrm>
+          <a:off x="0" y="0"/>
+          <a:ext cx="0" cy="0"/>
+          <a:chOff x="0" y="0"/>
+          <a:chExt cx="0" cy="0"/>
+        </a:xfrm>
+      </p:grpSpPr>
+      <p:sp>
+        <p:nvSpPr>
+          <p:cNvPr id="2" name="Title 1">
+            <a:extLst>
+              <a:ext uri="{FF2B5EF4-FFF2-40B4-BE49-F238E27FC236}">
+                <a16:creationId xmlns:a16="http://schemas.microsoft.com/office/drawing/2014/main" id="{F66D7CE3-46CA-4959-8821-FA494859218C}"/>
+              </a:ext>
+            </a:extLst>
+          </p:cNvPr>
+          <p:cNvSpPr>
+            <a:spLocks noGrp="1"/>
+          </p:cNvSpPr>
+          <p:nvPr>
+            <p:ph type="title"/>
+          </p:nvPr>
+        </p:nvSpPr>
+        <p:spPr/>
+        <p:txBody>
+          <a:bodyPr/>
+          <a:lstStyle/>
+          <a:p>
+            <a:r>
+              <a:rPr lang="en-US" dirty="0"/>
+              <a:t>Partner drop situation</a:t>
+            </a:r>
+          </a:p>
+        </p:txBody>
+      </p:sp>
+      <p:sp>
+        <p:nvSpPr>
+          <p:cNvPr id="3" name="Content Placeholder 2">
+            <a:extLst>
+              <a:ext uri="{FF2B5EF4-FFF2-40B4-BE49-F238E27FC236}">
+                <a16:creationId xmlns:a16="http://schemas.microsoft.com/office/drawing/2014/main" id="{11F3564B-7837-4F7A-B337-91EC70C28BF0}"/>
+              </a:ext>
+            </a:extLst>
+          </p:cNvPr>
+          <p:cNvSpPr>
+            <a:spLocks noGrp="1"/>
+          </p:cNvSpPr>
+          <p:nvPr>
+            <p:ph idx="1"/>
+          </p:nvPr>
+        </p:nvSpPr>
+        <p:spPr/>
+        <p:txBody>
+          <a:bodyPr/>
+          <a:lstStyle/>
+          <a:p>
+            <a:r>
+              <a:rPr lang="en-US" dirty="0"/>
+              <a:t>For folks </a:t>
+            </a:r>
+            <a:r>
+              <a:rPr lang="en-US" dirty="0" err="1"/>
+              <a:t>whos</a:t>
+            </a:r>
+            <a:r>
+              <a:rPr lang="en-US" dirty="0"/>
+              <a:t> partners have dropped, I’m going to</a:t>
+            </a:r>
+          </a:p>
+          <a:p>
+            <a:pPr marL="514350" indent="-514350">
+              <a:buFont typeface="+mj-lt"/>
+              <a:buAutoNum type="arabicPeriod"/>
+            </a:pPr>
+            <a:r>
+              <a:rPr lang="en-US" dirty="0"/>
+              <a:t>Find you a new </a:t>
+            </a:r>
+            <a:r>
+              <a:rPr lang="en-US"/>
+              <a:t>team for A18</a:t>
+            </a:r>
+            <a:endParaRPr lang="en-US" dirty="0"/>
+          </a:p>
+          <a:p>
+            <a:pPr marL="514350" indent="-514350">
+              <a:buFont typeface="+mj-lt"/>
+              <a:buAutoNum type="arabicPeriod"/>
+            </a:pPr>
+            <a:r>
+              <a:rPr lang="en-US" dirty="0"/>
+              <a:t>Ask you to finish 17a on your own, using the deadline for 17b</a:t>
+            </a:r>
+          </a:p>
+          <a:p>
+            <a:pPr marL="514350" indent="-514350">
+              <a:buFont typeface="+mj-lt"/>
+              <a:buAutoNum type="arabicPeriod"/>
+            </a:pPr>
+            <a:r>
+              <a:rPr lang="en-US" dirty="0"/>
+              <a:t>Not turn in 17b</a:t>
+            </a:r>
+          </a:p>
+        </p:txBody>
+      </p:sp>
+    </p:spTree>
+    <p:extLst>
+      <p:ext uri="{BB962C8B-B14F-4D97-AF65-F5344CB8AC3E}">
+        <p14:creationId xmlns:p14="http://schemas.microsoft.com/office/powerpoint/2010/main" val="718008235"/>
+      </p:ext>
+    </p:extLst>
+  </p:cSld>
+  <p:clrMapOvr>
+    <a:masterClrMapping/>
+  </p:clrMapOvr>
+</p:sld>
+</file>
+
+<file path=ppt/slides/slide17.xml><?xml version="1.0" encoding="utf-8"?>
 <p:sld xmlns:a="http://schemas.openxmlformats.org/drawingml/2006/main" xmlns:r="http://schemas.openxmlformats.org/officeDocument/2006/relationships" xmlns:p="http://schemas.openxmlformats.org/presentationml/2006/main" showMasterPhAnim="0">
   <p:cSld>
     <p:spTree>
@@ -10352,7 +10519,7 @@
 </p:sld>
 </file>
 
-<file path=ppt/slides/slide17.xml><?xml version="1.0" encoding="utf-8"?>
+<file path=ppt/slides/slide18.xml><?xml version="1.0" encoding="utf-8"?>
 <p:sld xmlns:a="http://schemas.openxmlformats.org/drawingml/2006/main" xmlns:r="http://schemas.openxmlformats.org/officeDocument/2006/relationships" xmlns:p="http://schemas.openxmlformats.org/presentationml/2006/main" showMasterPhAnim="0">
   <p:cSld>
     <p:spTree>
@@ -11978,7 +12145,7 @@
 </p:sld>
 </file>
 
-<file path=ppt/slides/slide18.xml><?xml version="1.0" encoding="utf-8"?>
+<file path=ppt/slides/slide19.xml><?xml version="1.0" encoding="utf-8"?>
 <p:sld xmlns:a="http://schemas.openxmlformats.org/drawingml/2006/main" xmlns:r="http://schemas.openxmlformats.org/officeDocument/2006/relationships" xmlns:p="http://schemas.openxmlformats.org/presentationml/2006/main">
   <p:cSld>
     <p:spTree>
@@ -12081,7 +12248,162 @@
 </p:sld>
 </file>
 
-<file path=ppt/slides/slide19.xml><?xml version="1.0" encoding="utf-8"?>
+<file path=ppt/slides/slide2.xml><?xml version="1.0" encoding="utf-8"?>
+<p:sld xmlns:a="http://schemas.openxmlformats.org/drawingml/2006/main" xmlns:r="http://schemas.openxmlformats.org/officeDocument/2006/relationships" xmlns:p="http://schemas.openxmlformats.org/presentationml/2006/main">
+  <p:cSld>
+    <p:spTree>
+      <p:nvGrpSpPr>
+        <p:cNvPr id="1" name=""/>
+        <p:cNvGrpSpPr/>
+        <p:nvPr/>
+      </p:nvGrpSpPr>
+      <p:grpSpPr>
+        <a:xfrm>
+          <a:off x="0" y="0"/>
+          <a:ext cx="0" cy="0"/>
+          <a:chOff x="0" y="0"/>
+          <a:chExt cx="0" cy="0"/>
+        </a:xfrm>
+      </p:grpSpPr>
+      <p:sp>
+        <p:nvSpPr>
+          <p:cNvPr id="2" name="Title 1">
+            <a:extLst>
+              <a:ext uri="{FF2B5EF4-FFF2-40B4-BE49-F238E27FC236}">
+                <a16:creationId xmlns:a16="http://schemas.microsoft.com/office/drawing/2014/main" id="{BA92FAAE-B45D-4A53-B3F3-C39C17D532D3}"/>
+              </a:ext>
+            </a:extLst>
+          </p:cNvPr>
+          <p:cNvSpPr>
+            <a:spLocks noGrp="1"/>
+          </p:cNvSpPr>
+          <p:nvPr>
+            <p:ph type="title"/>
+          </p:nvPr>
+        </p:nvSpPr>
+        <p:spPr/>
+        <p:txBody>
+          <a:bodyPr/>
+          <a:lstStyle/>
+          <a:p>
+            <a:r>
+              <a:rPr lang="en-US" sz="2000" dirty="0"/>
+              <a:t>The whole point of this problem is “do you  know how procedure evaluation works?” and “do you know the difference between defining a procedure and defining new syntax?” </a:t>
+            </a:r>
+            <a:br>
+              <a:rPr lang="en-US" sz="2000" dirty="0"/>
+            </a:br>
+            <a:r>
+              <a:rPr lang="en-US" sz="2000" dirty="0"/>
+              <a:t>0 points if you thought square! could be a procedure.</a:t>
+            </a:r>
+          </a:p>
+        </p:txBody>
+      </p:sp>
+      <p:pic>
+        <p:nvPicPr>
+          <p:cNvPr id="4" name="Picture 3">
+            <a:extLst>
+              <a:ext uri="{FF2B5EF4-FFF2-40B4-BE49-F238E27FC236}">
+                <a16:creationId xmlns:a16="http://schemas.microsoft.com/office/drawing/2014/main" id="{50FD8E0D-6975-404C-BEB4-BD61921A8E50}"/>
+              </a:ext>
+            </a:extLst>
+          </p:cNvPr>
+          <p:cNvPicPr>
+            <a:picLocks noChangeAspect="1"/>
+          </p:cNvPicPr>
+          <p:nvPr/>
+        </p:nvPicPr>
+        <p:blipFill>
+          <a:blip r:embed="rId2"/>
+          <a:stretch>
+            <a:fillRect/>
+          </a:stretch>
+        </p:blipFill>
+        <p:spPr>
+          <a:xfrm>
+            <a:off x="0" y="76200"/>
+            <a:ext cx="3366390" cy="3886200"/>
+          </a:xfrm>
+          <a:prstGeom prst="rect">
+            <a:avLst/>
+          </a:prstGeom>
+        </p:spPr>
+      </p:pic>
+      <p:pic>
+        <p:nvPicPr>
+          <p:cNvPr id="5" name="Picture 4">
+            <a:extLst>
+              <a:ext uri="{FF2B5EF4-FFF2-40B4-BE49-F238E27FC236}">
+                <a16:creationId xmlns:a16="http://schemas.microsoft.com/office/drawing/2014/main" id="{76676297-5B90-40CD-92FB-7163EBDFC728}"/>
+              </a:ext>
+            </a:extLst>
+          </p:cNvPr>
+          <p:cNvPicPr>
+            <a:picLocks noChangeAspect="1"/>
+          </p:cNvPicPr>
+          <p:nvPr/>
+        </p:nvPicPr>
+        <p:blipFill>
+          <a:blip r:embed="rId3"/>
+          <a:stretch>
+            <a:fillRect/>
+          </a:stretch>
+        </p:blipFill>
+        <p:spPr>
+          <a:xfrm>
+            <a:off x="0" y="4038600"/>
+            <a:ext cx="3200400" cy="2737914"/>
+          </a:xfrm>
+          <a:prstGeom prst="rect">
+            <a:avLst/>
+          </a:prstGeom>
+        </p:spPr>
+      </p:pic>
+      <p:pic>
+        <p:nvPicPr>
+          <p:cNvPr id="6" name="Picture 5">
+            <a:extLst>
+              <a:ext uri="{FF2B5EF4-FFF2-40B4-BE49-F238E27FC236}">
+                <a16:creationId xmlns:a16="http://schemas.microsoft.com/office/drawing/2014/main" id="{C0B79C9D-3E73-45DD-B789-61073AFF58FD}"/>
+              </a:ext>
+            </a:extLst>
+          </p:cNvPr>
+          <p:cNvPicPr>
+            <a:picLocks noChangeAspect="1"/>
+          </p:cNvPicPr>
+          <p:nvPr/>
+        </p:nvPicPr>
+        <p:blipFill>
+          <a:blip r:embed="rId4"/>
+          <a:stretch>
+            <a:fillRect/>
+          </a:stretch>
+        </p:blipFill>
+        <p:spPr>
+          <a:xfrm>
+            <a:off x="3236947" y="2019300"/>
+            <a:ext cx="8878853" cy="4000500"/>
+          </a:xfrm>
+          <a:prstGeom prst="rect">
+            <a:avLst/>
+          </a:prstGeom>
+        </p:spPr>
+      </p:pic>
+    </p:spTree>
+    <p:extLst>
+      <p:ext uri="{BB962C8B-B14F-4D97-AF65-F5344CB8AC3E}">
+        <p14:creationId xmlns:p14="http://schemas.microsoft.com/office/powerpoint/2010/main" val="21029671"/>
+      </p:ext>
+    </p:extLst>
+  </p:cSld>
+  <p:clrMapOvr>
+    <a:masterClrMapping/>
+  </p:clrMapOvr>
+</p:sld>
+</file>
+
+<file path=ppt/slides/slide20.xml><?xml version="1.0" encoding="utf-8"?>
 <p:sld xmlns:a="http://schemas.openxmlformats.org/drawingml/2006/main" xmlns:r="http://schemas.openxmlformats.org/officeDocument/2006/relationships" xmlns:p="http://schemas.openxmlformats.org/presentationml/2006/main" showMasterPhAnim="0">
   <p:cSld>
     <p:spTree>
@@ -13049,162 +13371,7 @@
 </p:sld>
 </file>
 
-<file path=ppt/slides/slide2.xml><?xml version="1.0" encoding="utf-8"?>
-<p:sld xmlns:a="http://schemas.openxmlformats.org/drawingml/2006/main" xmlns:r="http://schemas.openxmlformats.org/officeDocument/2006/relationships" xmlns:p="http://schemas.openxmlformats.org/presentationml/2006/main">
-  <p:cSld>
-    <p:spTree>
-      <p:nvGrpSpPr>
-        <p:cNvPr id="1" name=""/>
-        <p:cNvGrpSpPr/>
-        <p:nvPr/>
-      </p:nvGrpSpPr>
-      <p:grpSpPr>
-        <a:xfrm>
-          <a:off x="0" y="0"/>
-          <a:ext cx="0" cy="0"/>
-          <a:chOff x="0" y="0"/>
-          <a:chExt cx="0" cy="0"/>
-        </a:xfrm>
-      </p:grpSpPr>
-      <p:sp>
-        <p:nvSpPr>
-          <p:cNvPr id="2" name="Title 1">
-            <a:extLst>
-              <a:ext uri="{FF2B5EF4-FFF2-40B4-BE49-F238E27FC236}">
-                <a16:creationId xmlns:a16="http://schemas.microsoft.com/office/drawing/2014/main" id="{BA92FAAE-B45D-4A53-B3F3-C39C17D532D3}"/>
-              </a:ext>
-            </a:extLst>
-          </p:cNvPr>
-          <p:cNvSpPr>
-            <a:spLocks noGrp="1"/>
-          </p:cNvSpPr>
-          <p:nvPr>
-            <p:ph type="title"/>
-          </p:nvPr>
-        </p:nvSpPr>
-        <p:spPr/>
-        <p:txBody>
-          <a:bodyPr/>
-          <a:lstStyle/>
-          <a:p>
-            <a:r>
-              <a:rPr lang="en-US" sz="2000" dirty="0"/>
-              <a:t>The whole point of this problem is “do you  know how procedure evaluation works?” and “do you know the difference between defining a procedure and defining new syntax?” </a:t>
-            </a:r>
-            <a:br>
-              <a:rPr lang="en-US" sz="2000" dirty="0"/>
-            </a:br>
-            <a:r>
-              <a:rPr lang="en-US" sz="2000" dirty="0"/>
-              <a:t>0 points if you thought square! could be a procedure.</a:t>
-            </a:r>
-          </a:p>
-        </p:txBody>
-      </p:sp>
-      <p:pic>
-        <p:nvPicPr>
-          <p:cNvPr id="4" name="Picture 3">
-            <a:extLst>
-              <a:ext uri="{FF2B5EF4-FFF2-40B4-BE49-F238E27FC236}">
-                <a16:creationId xmlns:a16="http://schemas.microsoft.com/office/drawing/2014/main" id="{50FD8E0D-6975-404C-BEB4-BD61921A8E50}"/>
-              </a:ext>
-            </a:extLst>
-          </p:cNvPr>
-          <p:cNvPicPr>
-            <a:picLocks noChangeAspect="1"/>
-          </p:cNvPicPr>
-          <p:nvPr/>
-        </p:nvPicPr>
-        <p:blipFill>
-          <a:blip r:embed="rId2"/>
-          <a:stretch>
-            <a:fillRect/>
-          </a:stretch>
-        </p:blipFill>
-        <p:spPr>
-          <a:xfrm>
-            <a:off x="0" y="76200"/>
-            <a:ext cx="3366390" cy="3886200"/>
-          </a:xfrm>
-          <a:prstGeom prst="rect">
-            <a:avLst/>
-          </a:prstGeom>
-        </p:spPr>
-      </p:pic>
-      <p:pic>
-        <p:nvPicPr>
-          <p:cNvPr id="5" name="Picture 4">
-            <a:extLst>
-              <a:ext uri="{FF2B5EF4-FFF2-40B4-BE49-F238E27FC236}">
-                <a16:creationId xmlns:a16="http://schemas.microsoft.com/office/drawing/2014/main" id="{76676297-5B90-40CD-92FB-7163EBDFC728}"/>
-              </a:ext>
-            </a:extLst>
-          </p:cNvPr>
-          <p:cNvPicPr>
-            <a:picLocks noChangeAspect="1"/>
-          </p:cNvPicPr>
-          <p:nvPr/>
-        </p:nvPicPr>
-        <p:blipFill>
-          <a:blip r:embed="rId3"/>
-          <a:stretch>
-            <a:fillRect/>
-          </a:stretch>
-        </p:blipFill>
-        <p:spPr>
-          <a:xfrm>
-            <a:off x="0" y="4038600"/>
-            <a:ext cx="3200400" cy="2737914"/>
-          </a:xfrm>
-          <a:prstGeom prst="rect">
-            <a:avLst/>
-          </a:prstGeom>
-        </p:spPr>
-      </p:pic>
-      <p:pic>
-        <p:nvPicPr>
-          <p:cNvPr id="6" name="Picture 5">
-            <a:extLst>
-              <a:ext uri="{FF2B5EF4-FFF2-40B4-BE49-F238E27FC236}">
-                <a16:creationId xmlns:a16="http://schemas.microsoft.com/office/drawing/2014/main" id="{C0B79C9D-3E73-45DD-B789-61073AFF58FD}"/>
-              </a:ext>
-            </a:extLst>
-          </p:cNvPr>
-          <p:cNvPicPr>
-            <a:picLocks noChangeAspect="1"/>
-          </p:cNvPicPr>
-          <p:nvPr/>
-        </p:nvPicPr>
-        <p:blipFill>
-          <a:blip r:embed="rId4"/>
-          <a:stretch>
-            <a:fillRect/>
-          </a:stretch>
-        </p:blipFill>
-        <p:spPr>
-          <a:xfrm>
-            <a:off x="3236947" y="2019300"/>
-            <a:ext cx="8878853" cy="4000500"/>
-          </a:xfrm>
-          <a:prstGeom prst="rect">
-            <a:avLst/>
-          </a:prstGeom>
-        </p:spPr>
-      </p:pic>
-    </p:spTree>
-    <p:extLst>
-      <p:ext uri="{BB962C8B-B14F-4D97-AF65-F5344CB8AC3E}">
-        <p14:creationId xmlns:p14="http://schemas.microsoft.com/office/powerpoint/2010/main" val="21029671"/>
-      </p:ext>
-    </p:extLst>
-  </p:cSld>
-  <p:clrMapOvr>
-    <a:masterClrMapping/>
-  </p:clrMapOvr>
-</p:sld>
-</file>
-
-<file path=ppt/slides/slide20.xml><?xml version="1.0" encoding="utf-8"?>
+<file path=ppt/slides/slide21.xml><?xml version="1.0" encoding="utf-8"?>
 <p:sld xmlns:a="http://schemas.openxmlformats.org/drawingml/2006/main" xmlns:r="http://schemas.openxmlformats.org/officeDocument/2006/relationships" xmlns:p="http://schemas.openxmlformats.org/presentationml/2006/main" showMasterPhAnim="0">
   <p:cSld>
     <p:spTree>
@@ -15050,7 +15217,7 @@
 </p:sld>
 </file>
 
-<file path=ppt/slides/slide21.xml><?xml version="1.0" encoding="utf-8"?>
+<file path=ppt/slides/slide22.xml><?xml version="1.0" encoding="utf-8"?>
 <p:sld xmlns:a="http://schemas.openxmlformats.org/drawingml/2006/main" xmlns:r="http://schemas.openxmlformats.org/officeDocument/2006/relationships" xmlns:p="http://schemas.openxmlformats.org/presentationml/2006/main" showMasterPhAnim="0" show="0">
   <p:cSld>
     <p:spTree>
@@ -15731,7 +15898,7 @@
 </p:sld>
 </file>
 
-<file path=ppt/slides/slide22.xml><?xml version="1.0" encoding="utf-8"?>
+<file path=ppt/slides/slide23.xml><?xml version="1.0" encoding="utf-8"?>
 <p:sld xmlns:a="http://schemas.openxmlformats.org/drawingml/2006/main" xmlns:r="http://schemas.openxmlformats.org/officeDocument/2006/relationships" xmlns:p="http://schemas.openxmlformats.org/presentationml/2006/main" showMasterPhAnim="0" show="0">
   <p:cSld>
     <p:spTree>
@@ -16366,7 +16533,7 @@
 </p:sld>
 </file>
 
-<file path=ppt/slides/slide23.xml><?xml version="1.0" encoding="utf-8"?>
+<file path=ppt/slides/slide24.xml><?xml version="1.0" encoding="utf-8"?>
 <p:sld xmlns:a="http://schemas.openxmlformats.org/drawingml/2006/main" xmlns:r="http://schemas.openxmlformats.org/officeDocument/2006/relationships" xmlns:p="http://schemas.openxmlformats.org/presentationml/2006/main" show="0">
   <p:cSld>
     <p:spTree>
@@ -16617,7 +16784,7 @@
 </p:sld>
 </file>
 
-<file path=ppt/slides/slide24.xml><?xml version="1.0" encoding="utf-8"?>
+<file path=ppt/slides/slide25.xml><?xml version="1.0" encoding="utf-8"?>
 <p:sld xmlns:a="http://schemas.openxmlformats.org/drawingml/2006/main" xmlns:r="http://schemas.openxmlformats.org/officeDocument/2006/relationships" xmlns:p="http://schemas.openxmlformats.org/presentationml/2006/main" show="0">
   <p:cSld>
     <p:spTree>
@@ -17004,7 +17171,7 @@
 </p:sld>
 </file>
 
-<file path=ppt/slides/slide25.xml><?xml version="1.0" encoding="utf-8"?>
+<file path=ppt/slides/slide26.xml><?xml version="1.0" encoding="utf-8"?>
 <p:sld xmlns:a="http://schemas.openxmlformats.org/drawingml/2006/main" xmlns:r="http://schemas.openxmlformats.org/officeDocument/2006/relationships" xmlns:p="http://schemas.openxmlformats.org/presentationml/2006/main">
   <p:cSld>
     <p:spTree>
@@ -17108,7 +17275,7 @@
 </p:sld>
 </file>
 
-<file path=ppt/slides/slide26.xml><?xml version="1.0" encoding="utf-8"?>
+<file path=ppt/slides/slide27.xml><?xml version="1.0" encoding="utf-8"?>
 <p:sld xmlns:a="http://schemas.openxmlformats.org/drawingml/2006/main" xmlns:r="http://schemas.openxmlformats.org/officeDocument/2006/relationships" xmlns:p="http://schemas.openxmlformats.org/presentationml/2006/main">
   <p:cSld>
     <p:spTree>
@@ -17416,7 +17583,7 @@
 </p:sld>
 </file>
 
-<file path=ppt/slides/slide27.xml><?xml version="1.0" encoding="utf-8"?>
+<file path=ppt/slides/slide28.xml><?xml version="1.0" encoding="utf-8"?>
 <p:sld xmlns:a="http://schemas.openxmlformats.org/drawingml/2006/main" xmlns:r="http://schemas.openxmlformats.org/officeDocument/2006/relationships" xmlns:p="http://schemas.openxmlformats.org/presentationml/2006/main">
   <p:cSld>
     <p:spTree>
@@ -17496,7 +17663,7 @@
 </p:sld>
 </file>
 
-<file path=ppt/slides/slide28.xml><?xml version="1.0" encoding="utf-8"?>
+<file path=ppt/slides/slide29.xml><?xml version="1.0" encoding="utf-8"?>
 <p:sld xmlns:a="http://schemas.openxmlformats.org/drawingml/2006/main" xmlns:r="http://schemas.openxmlformats.org/officeDocument/2006/relationships" xmlns:p="http://schemas.openxmlformats.org/presentationml/2006/main">
   <p:cSld>
     <p:spTree>
@@ -17735,7 +17902,99 @@
 </p:sld>
 </file>
 
-<file path=ppt/slides/slide29.xml><?xml version="1.0" encoding="utf-8"?>
+<file path=ppt/slides/slide3.xml><?xml version="1.0" encoding="utf-8"?>
+<p:sld xmlns:a="http://schemas.openxmlformats.org/drawingml/2006/main" xmlns:r="http://schemas.openxmlformats.org/officeDocument/2006/relationships" xmlns:p="http://schemas.openxmlformats.org/presentationml/2006/main">
+  <p:cSld>
+    <p:spTree>
+      <p:nvGrpSpPr>
+        <p:cNvPr id="1" name=""/>
+        <p:cNvGrpSpPr/>
+        <p:nvPr/>
+      </p:nvGrpSpPr>
+      <p:grpSpPr>
+        <a:xfrm>
+          <a:off x="0" y="0"/>
+          <a:ext cx="0" cy="0"/>
+          <a:chOff x="0" y="0"/>
+          <a:chExt cx="0" cy="0"/>
+        </a:xfrm>
+      </p:grpSpPr>
+      <p:sp>
+        <p:nvSpPr>
+          <p:cNvPr id="2" name="Title 1">
+            <a:extLst>
+              <a:ext uri="{FF2B5EF4-FFF2-40B4-BE49-F238E27FC236}">
+                <a16:creationId xmlns:a16="http://schemas.microsoft.com/office/drawing/2014/main" id="{27919437-57E2-4012-87D2-4FA31CF12D58}"/>
+              </a:ext>
+            </a:extLst>
+          </p:cNvPr>
+          <p:cNvSpPr>
+            <a:spLocks noGrp="1"/>
+          </p:cNvSpPr>
+          <p:nvPr>
+            <p:ph type="title"/>
+          </p:nvPr>
+        </p:nvSpPr>
+        <p:spPr/>
+        <p:txBody>
+          <a:bodyPr/>
+          <a:lstStyle/>
+          <a:p>
+            <a:r>
+              <a:rPr lang="en-US" dirty="0"/>
+              <a:t>Letrec implementation description</a:t>
+            </a:r>
+          </a:p>
+        </p:txBody>
+      </p:sp>
+      <p:sp>
+        <p:nvSpPr>
+          <p:cNvPr id="3" name="Content Placeholder 2">
+            <a:extLst>
+              <a:ext uri="{FF2B5EF4-FFF2-40B4-BE49-F238E27FC236}">
+                <a16:creationId xmlns:a16="http://schemas.microsoft.com/office/drawing/2014/main" id="{16CEC020-FE80-46EC-A42C-818DBC87BD40}"/>
+              </a:ext>
+            </a:extLst>
+          </p:cNvPr>
+          <p:cNvSpPr>
+            <a:spLocks noGrp="1"/>
+          </p:cNvSpPr>
+          <p:nvPr>
+            <p:ph idx="1"/>
+          </p:nvPr>
+        </p:nvSpPr>
+        <p:spPr/>
+        <p:txBody>
+          <a:bodyPr/>
+          <a:lstStyle/>
+          <a:p>
+            <a:r>
+              <a:rPr lang="en-US" dirty="0"/>
+              <a:t>The main thing I was looking for is a description of how the circularity is achieved. </a:t>
+            </a:r>
+          </a:p>
+          <a:p>
+            <a:r>
+              <a:rPr lang="en-US" dirty="0"/>
+              <a:t>Some students went into detail on what a ribcage is, but  missed saying that the environment is created first, then closures that point to that environment, then those closures are added as environment values using vector-set!</a:t>
+            </a:r>
+          </a:p>
+        </p:txBody>
+      </p:sp>
+    </p:spTree>
+    <p:extLst>
+      <p:ext uri="{BB962C8B-B14F-4D97-AF65-F5344CB8AC3E}">
+        <p14:creationId xmlns:p14="http://schemas.microsoft.com/office/powerpoint/2010/main" val="1905614036"/>
+      </p:ext>
+    </p:extLst>
+  </p:cSld>
+  <p:clrMapOvr>
+    <a:masterClrMapping/>
+  </p:clrMapOvr>
+</p:sld>
+</file>
+
+<file path=ppt/slides/slide30.xml><?xml version="1.0" encoding="utf-8"?>
 <p:sld xmlns:a="http://schemas.openxmlformats.org/drawingml/2006/main" xmlns:r="http://schemas.openxmlformats.org/officeDocument/2006/relationships" xmlns:p="http://schemas.openxmlformats.org/presentationml/2006/main">
   <p:cSld>
     <p:spTree>
@@ -17818,99 +18077,7 @@
 </p:sld>
 </file>
 
-<file path=ppt/slides/slide3.xml><?xml version="1.0" encoding="utf-8"?>
-<p:sld xmlns:a="http://schemas.openxmlformats.org/drawingml/2006/main" xmlns:r="http://schemas.openxmlformats.org/officeDocument/2006/relationships" xmlns:p="http://schemas.openxmlformats.org/presentationml/2006/main">
-  <p:cSld>
-    <p:spTree>
-      <p:nvGrpSpPr>
-        <p:cNvPr id="1" name=""/>
-        <p:cNvGrpSpPr/>
-        <p:nvPr/>
-      </p:nvGrpSpPr>
-      <p:grpSpPr>
-        <a:xfrm>
-          <a:off x="0" y="0"/>
-          <a:ext cx="0" cy="0"/>
-          <a:chOff x="0" y="0"/>
-          <a:chExt cx="0" cy="0"/>
-        </a:xfrm>
-      </p:grpSpPr>
-      <p:sp>
-        <p:nvSpPr>
-          <p:cNvPr id="2" name="Title 1">
-            <a:extLst>
-              <a:ext uri="{FF2B5EF4-FFF2-40B4-BE49-F238E27FC236}">
-                <a16:creationId xmlns:a16="http://schemas.microsoft.com/office/drawing/2014/main" id="{27919437-57E2-4012-87D2-4FA31CF12D58}"/>
-              </a:ext>
-            </a:extLst>
-          </p:cNvPr>
-          <p:cNvSpPr>
-            <a:spLocks noGrp="1"/>
-          </p:cNvSpPr>
-          <p:nvPr>
-            <p:ph type="title"/>
-          </p:nvPr>
-        </p:nvSpPr>
-        <p:spPr/>
-        <p:txBody>
-          <a:bodyPr/>
-          <a:lstStyle/>
-          <a:p>
-            <a:r>
-              <a:rPr lang="en-US" dirty="0"/>
-              <a:t>Letrec implementation description</a:t>
-            </a:r>
-          </a:p>
-        </p:txBody>
-      </p:sp>
-      <p:sp>
-        <p:nvSpPr>
-          <p:cNvPr id="3" name="Content Placeholder 2">
-            <a:extLst>
-              <a:ext uri="{FF2B5EF4-FFF2-40B4-BE49-F238E27FC236}">
-                <a16:creationId xmlns:a16="http://schemas.microsoft.com/office/drawing/2014/main" id="{16CEC020-FE80-46EC-A42C-818DBC87BD40}"/>
-              </a:ext>
-            </a:extLst>
-          </p:cNvPr>
-          <p:cNvSpPr>
-            <a:spLocks noGrp="1"/>
-          </p:cNvSpPr>
-          <p:nvPr>
-            <p:ph idx="1"/>
-          </p:nvPr>
-        </p:nvSpPr>
-        <p:spPr/>
-        <p:txBody>
-          <a:bodyPr/>
-          <a:lstStyle/>
-          <a:p>
-            <a:r>
-              <a:rPr lang="en-US" dirty="0"/>
-              <a:t>The main thing I was looking for is a description of how the circularity is achieved. </a:t>
-            </a:r>
-          </a:p>
-          <a:p>
-            <a:r>
-              <a:rPr lang="en-US" dirty="0"/>
-              <a:t>Some students went into detail on what a ribcage is, but  missed saying that the environment is created first, then closures that point to that environment, then those closures are added as environment values using vector-set!</a:t>
-            </a:r>
-          </a:p>
-        </p:txBody>
-      </p:sp>
-    </p:spTree>
-    <p:extLst>
-      <p:ext uri="{BB962C8B-B14F-4D97-AF65-F5344CB8AC3E}">
-        <p14:creationId xmlns:p14="http://schemas.microsoft.com/office/powerpoint/2010/main" val="1905614036"/>
-      </p:ext>
-    </p:extLst>
-  </p:cSld>
-  <p:clrMapOvr>
-    <a:masterClrMapping/>
-  </p:clrMapOvr>
-</p:sld>
-</file>
-
-<file path=ppt/slides/slide30.xml><?xml version="1.0" encoding="utf-8"?>
+<file path=ppt/slides/slide31.xml><?xml version="1.0" encoding="utf-8"?>
 <p:sld xmlns:a="http://schemas.openxmlformats.org/drawingml/2006/main" xmlns:r="http://schemas.openxmlformats.org/officeDocument/2006/relationships" xmlns:p="http://schemas.openxmlformats.org/presentationml/2006/main">
   <p:cSld>
     <p:spTree>
@@ -18022,7 +18189,7 @@
 </p:sld>
 </file>
 
-<file path=ppt/slides/slide31.xml><?xml version="1.0" encoding="utf-8"?>
+<file path=ppt/slides/slide32.xml><?xml version="1.0" encoding="utf-8"?>
 <p:sld xmlns:a="http://schemas.openxmlformats.org/drawingml/2006/main" xmlns:r="http://schemas.openxmlformats.org/officeDocument/2006/relationships" xmlns:p="http://schemas.openxmlformats.org/presentationml/2006/main">
   <p:cSld>
     <p:spTree>
@@ -18667,7 +18834,7 @@
 </p:sld>
 </file>
 
-<file path=ppt/slides/slide32.xml><?xml version="1.0" encoding="utf-8"?>
+<file path=ppt/slides/slide33.xml><?xml version="1.0" encoding="utf-8"?>
 <p:sld xmlns:a="http://schemas.openxmlformats.org/drawingml/2006/main" xmlns:r="http://schemas.openxmlformats.org/officeDocument/2006/relationships" xmlns:p="http://schemas.openxmlformats.org/presentationml/2006/main">
   <p:cSld>
     <p:spTree>
@@ -19989,7 +20156,7 @@
 </p:sld>
 </file>
 
-<file path=ppt/slides/slide33.xml><?xml version="1.0" encoding="utf-8"?>
+<file path=ppt/slides/slide34.xml><?xml version="1.0" encoding="utf-8"?>
 <p:sld xmlns:a="http://schemas.openxmlformats.org/drawingml/2006/main" xmlns:r="http://schemas.openxmlformats.org/officeDocument/2006/relationships" xmlns:p="http://schemas.openxmlformats.org/presentationml/2006/main">
   <p:cSld>
     <p:spTree>
@@ -20077,7 +20244,7 @@
 </p:sld>
 </file>
 
-<file path=ppt/slides/slide34.xml><?xml version="1.0" encoding="utf-8"?>
+<file path=ppt/slides/slide35.xml><?xml version="1.0" encoding="utf-8"?>
 <p:sld xmlns:a="http://schemas.openxmlformats.org/drawingml/2006/main" xmlns:r="http://schemas.openxmlformats.org/officeDocument/2006/relationships" xmlns:p="http://schemas.openxmlformats.org/presentationml/2006/main">
   <p:cSld>
     <p:spTree>
@@ -20189,7 +20356,7 @@
 </p:sld>
 </file>
 
-<file path=ppt/slides/slide35.xml><?xml version="1.0" encoding="utf-8"?>
+<file path=ppt/slides/slide36.xml><?xml version="1.0" encoding="utf-8"?>
 <p:sld xmlns:a="http://schemas.openxmlformats.org/drawingml/2006/main" xmlns:r="http://schemas.openxmlformats.org/officeDocument/2006/relationships" xmlns:p="http://schemas.openxmlformats.org/presentationml/2006/main">
   <p:cSld>
     <p:spTree>
@@ -20270,7 +20437,7 @@
 </p:sld>
 </file>
 
-<file path=ppt/slides/slide36.xml><?xml version="1.0" encoding="utf-8"?>
+<file path=ppt/slides/slide37.xml><?xml version="1.0" encoding="utf-8"?>
 <p:sld xmlns:a="http://schemas.openxmlformats.org/drawingml/2006/main" xmlns:r="http://schemas.openxmlformats.org/officeDocument/2006/relationships" xmlns:p="http://schemas.openxmlformats.org/presentationml/2006/main">
   <p:cSld>
     <p:spTree>
@@ -20351,7 +20518,7 @@
 </p:sld>
 </file>
 
-<file path=ppt/slides/slide37.xml><?xml version="1.0" encoding="utf-8"?>
+<file path=ppt/slides/slide38.xml><?xml version="1.0" encoding="utf-8"?>
 <p:sld xmlns:a="http://schemas.openxmlformats.org/drawingml/2006/main" xmlns:r="http://schemas.openxmlformats.org/officeDocument/2006/relationships" xmlns:p="http://schemas.openxmlformats.org/presentationml/2006/main">
   <p:cSld>
     <p:spTree>
@@ -20463,7 +20630,7 @@
 </p:sld>
 </file>
 
-<file path=ppt/slides/slide38.xml><?xml version="1.0" encoding="utf-8"?>
+<file path=ppt/slides/slide39.xml><?xml version="1.0" encoding="utf-8"?>
 <p:sld xmlns:a="http://schemas.openxmlformats.org/drawingml/2006/main" xmlns:r="http://schemas.openxmlformats.org/officeDocument/2006/relationships" xmlns:p="http://schemas.openxmlformats.org/presentationml/2006/main">
   <p:cSld>
     <p:spTree>

</xml_diff>